<commit_message>
put each algoritm in its own notebook. Updated powerpoint with algorithm reults.
</commit_message>
<xml_diff>
--- a/Resources/20220411_Project2_Group2.pptx
+++ b/Resources/20220411_Project2_Group2.pptx
@@ -3971,7 +3971,7 @@
           <a:p>
             <a:fld id="{EA0C0817-A112-4847-8014-A94B7D2A4EA3}" type="datetime1">
               <a:rPr lang="en-US" smtClean="0"/>
-              <a:t>4/11/2022</a:t>
+              <a:t>4/12/2022</a:t>
             </a:fld>
             <a:endParaRPr lang="en-US" dirty="0"/>
           </a:p>
@@ -4173,7 +4173,7 @@
           <a:p>
             <a:fld id="{7332B432-ACDA-4023-A761-2BAB76577B62}" type="datetime1">
               <a:rPr lang="en-US" smtClean="0"/>
-              <a:t>4/11/2022</a:t>
+              <a:t>4/12/2022</a:t>
             </a:fld>
             <a:endParaRPr lang="en-US" dirty="0"/>
           </a:p>
@@ -4772,7 +4772,7 @@
           <a:p>
             <a:fld id="{D9C646AA-F36E-4540-911D-FFFC0A0EF24A}" type="datetime1">
               <a:rPr lang="en-US" smtClean="0"/>
-              <a:t>4/11/2022</a:t>
+              <a:t>4/12/2022</a:t>
             </a:fld>
             <a:endParaRPr lang="en-US" dirty="0"/>
           </a:p>
@@ -5092,7 +5092,7 @@
           <a:p>
             <a:fld id="{69186D26-FA5F-4637-B602-B7C2DC34CFD4}" type="datetime1">
               <a:rPr lang="en-US" smtClean="0"/>
-              <a:t>4/11/2022</a:t>
+              <a:t>4/12/2022</a:t>
             </a:fld>
             <a:endParaRPr lang="en-US" dirty="0"/>
           </a:p>
@@ -5529,7 +5529,7 @@
           <a:p>
             <a:fld id="{8A7F15D8-96D1-4781-BC50-CA8A088B2FE4}" type="datetime1">
               <a:rPr lang="en-US" smtClean="0"/>
-              <a:t>4/11/2022</a:t>
+              <a:t>4/12/2022</a:t>
             </a:fld>
             <a:endParaRPr lang="en-US" dirty="0"/>
           </a:p>
@@ -5647,7 +5647,7 @@
           <a:p>
             <a:fld id="{F9A96C99-B8F8-4528-BD05-0E16E943DC09}" type="datetime1">
               <a:rPr lang="en-US" smtClean="0"/>
-              <a:t>4/11/2022</a:t>
+              <a:t>4/12/2022</a:t>
             </a:fld>
             <a:endParaRPr lang="en-US" dirty="0"/>
           </a:p>
@@ -5742,7 +5742,7 @@
           <a:p>
             <a:fld id="{03636942-C211-4B28-8DBD-C953E00AF71B}" type="datetime1">
               <a:rPr lang="en-US" smtClean="0"/>
-              <a:t>4/11/2022</a:t>
+              <a:t>4/12/2022</a:t>
             </a:fld>
             <a:endParaRPr lang="en-US" dirty="0"/>
           </a:p>
@@ -6159,7 +6159,7 @@
           <a:p>
             <a:fld id="{7E8D12A6-918A-48BD-8CB9-CA713993B0EA}" type="datetime1">
               <a:rPr lang="en-US" smtClean="0"/>
-              <a:t>4/11/2022</a:t>
+              <a:t>4/12/2022</a:t>
             </a:fld>
             <a:endParaRPr lang="en-US" dirty="0"/>
           </a:p>
@@ -6421,7 +6421,7 @@
             <a:fld id="{E778CE86-875F-4587-BCF6-FA054AFC0D53}" type="datetime1">
               <a:rPr lang="en-US" smtClean="0"/>
               <a:pPr/>
-              <a:t>4/11/2022</a:t>
+              <a:t>4/12/2022</a:t>
             </a:fld>
             <a:endParaRPr lang="en-US" dirty="0"/>
           </a:p>
@@ -6937,7 +6937,7 @@
           <a:p>
             <a:fld id="{F6FA2B21-3FCD-4721-B95C-427943F61125}" type="datetime1">
               <a:rPr lang="en-US" smtClean="0"/>
-              <a:t>4/11/2022</a:t>
+              <a:t>4/12/2022</a:t>
             </a:fld>
             <a:endParaRPr lang="en-US" dirty="0"/>
           </a:p>
@@ -8943,7 +8943,7 @@
             </a:br>
             <a:r>
               <a:rPr lang="en-US" sz="1600" dirty="0"/>
-              <a:t>*Based on data pulled on 4/11/2022</a:t>
+              <a:t>*Based on data pulled on 4/13/2022</a:t>
             </a:r>
           </a:p>
         </p:txBody>
@@ -8963,14 +8963,14 @@
           <p:nvPr>
             <p:extLst>
               <p:ext uri="{D42A27DB-BD31-4B8C-83A1-F6EECF244321}">
-                <p14:modId xmlns:p14="http://schemas.microsoft.com/office/powerpoint/2010/main" val="659941883"/>
+                <p14:modId xmlns:p14="http://schemas.microsoft.com/office/powerpoint/2010/main" val="1008106804"/>
               </p:ext>
             </p:extLst>
           </p:nvPr>
         </p:nvGraphicFramePr>
         <p:xfrm>
           <a:off x="1634308" y="1811046"/>
-          <a:ext cx="7874000" cy="3662680"/>
+          <a:ext cx="7874000" cy="4221480"/>
         </p:xfrm>
         <a:graphic>
           <a:graphicData uri="http://schemas.openxmlformats.org/drawingml/2006/table">
@@ -9022,7 +9022,7 @@
                     <a:lstStyle/>
                     <a:p>
                       <a:pPr algn="ctr"/>
-                      <a:endParaRPr lang="en-US"/>
+                      <a:endParaRPr lang="en-US" dirty="0"/>
                     </a:p>
                   </a:txBody>
                   <a:tcPr anchor="ctr"/>
@@ -9117,19 +9117,19 @@
                     <a:p>
                       <a:r>
                         <a:rPr lang="en-US" dirty="0"/>
-                        <a:t>1571 hold</a:t>
+                        <a:t>1606 hold</a:t>
                       </a:r>
                     </a:p>
                     <a:p>
                       <a:r>
                         <a:rPr lang="en-US" dirty="0"/>
-                        <a:t>69 sell</a:t>
+                        <a:t>68 buy</a:t>
                       </a:r>
                     </a:p>
                     <a:p>
                       <a:r>
                         <a:rPr lang="en-US" dirty="0"/>
-                        <a:t>69 buy</a:t>
+                        <a:t>68 sell</a:t>
                       </a:r>
                     </a:p>
                   </a:txBody>
@@ -9142,19 +9142,19 @@
                     <a:p>
                       <a:r>
                         <a:rPr lang="en-US" dirty="0"/>
-                        <a:t>1470 hold</a:t>
+                        <a:t>1745 hold</a:t>
                       </a:r>
                     </a:p>
                     <a:p>
                       <a:r>
                         <a:rPr lang="en-US" dirty="0"/>
-                        <a:t>146 sell</a:t>
+                        <a:t>8 buy</a:t>
                       </a:r>
                     </a:p>
                     <a:p>
                       <a:r>
                         <a:rPr lang="en-US" dirty="0"/>
-                        <a:t>94 buy</a:t>
+                        <a:t>8 sell</a:t>
                       </a:r>
                     </a:p>
                   </a:txBody>
@@ -9173,13 +9173,13 @@
                     <a:p>
                       <a:r>
                         <a:rPr lang="en-US" dirty="0"/>
-                        <a:t>207 sell</a:t>
+                        <a:t>207 buy</a:t>
                       </a:r>
                     </a:p>
                     <a:p>
                       <a:r>
                         <a:rPr lang="en-US" dirty="0"/>
-                        <a:t>207 buy</a:t>
+                        <a:t>207 sell</a:t>
                       </a:r>
                     </a:p>
                   </a:txBody>
@@ -9190,7 +9190,22 @@
                     <a:bodyPr/>
                     <a:lstStyle/>
                     <a:p>
-                      <a:endParaRPr lang="en-US" dirty="0"/>
+                      <a:r>
+                        <a:rPr lang="en-US" dirty="0"/>
+                        <a:t>1486 hold</a:t>
+                      </a:r>
+                    </a:p>
+                    <a:p>
+                      <a:r>
+                        <a:rPr lang="en-US" dirty="0"/>
+                        <a:t>128 buy</a:t>
+                      </a:r>
+                    </a:p>
+                    <a:p>
+                      <a:r>
+                        <a:rPr lang="en-US" dirty="0"/>
+                        <a:t>128 sell</a:t>
+                      </a:r>
                     </a:p>
                   </a:txBody>
                   <a:tcPr/>
@@ -9221,7 +9236,17 @@
                     <a:lstStyle/>
                     <a:p>
                       <a:pPr algn="ctr"/>
-                      <a:endParaRPr lang="en-US" b="1" dirty="0"/>
+                      <a:r>
+                        <a:rPr lang="en-US" b="1" dirty="0"/>
+                        <a:t>(26/42)</a:t>
+                      </a:r>
+                    </a:p>
+                    <a:p>
+                      <a:pPr algn="ctr"/>
+                      <a:r>
+                        <a:rPr lang="en-US" b="1" dirty="0"/>
+                        <a:t>38.24%</a:t>
+                      </a:r>
                     </a:p>
                   </a:txBody>
                   <a:tcPr>
@@ -9234,7 +9259,17 @@
                     <a:lstStyle/>
                     <a:p>
                       <a:pPr algn="ctr"/>
-                      <a:endParaRPr lang="en-US" b="1" dirty="0"/>
+                      <a:r>
+                        <a:rPr lang="en-US" b="1" dirty="0"/>
+                        <a:t>(5/3)</a:t>
+                      </a:r>
+                    </a:p>
+                    <a:p>
+                      <a:pPr algn="ctr"/>
+                      <a:r>
+                        <a:rPr lang="en-US" b="1" dirty="0"/>
+                        <a:t>62.50%</a:t>
+                      </a:r>
                     </a:p>
                   </a:txBody>
                   <a:tcPr anchor="ctr">
@@ -9247,7 +9282,17 @@
                     <a:lstStyle/>
                     <a:p>
                       <a:pPr algn="ctr"/>
-                      <a:endParaRPr lang="en-US" b="1" dirty="0"/>
+                      <a:r>
+                        <a:rPr lang="en-US" b="1" dirty="0"/>
+                        <a:t>(88/121)</a:t>
+                      </a:r>
+                    </a:p>
+                    <a:p>
+                      <a:pPr algn="ctr"/>
+                      <a:r>
+                        <a:rPr lang="en-US" b="1" dirty="0"/>
+                        <a:t>42.10%</a:t>
+                      </a:r>
                     </a:p>
                   </a:txBody>
                   <a:tcPr anchor="ctr">
@@ -9260,7 +9305,17 @@
                     <a:lstStyle/>
                     <a:p>
                       <a:pPr algn="ctr"/>
-                      <a:endParaRPr lang="en-US" b="1" dirty="0"/>
+                      <a:r>
+                        <a:rPr lang="en-US" b="1" dirty="0"/>
+                        <a:t>(60/68)</a:t>
+                      </a:r>
+                    </a:p>
+                    <a:p>
+                      <a:pPr algn="ctr"/>
+                      <a:r>
+                        <a:rPr lang="en-US" b="1" dirty="0"/>
+                        <a:t>46.88%</a:t>
+                      </a:r>
                     </a:p>
                   </a:txBody>
                   <a:tcPr anchor="ctr">
@@ -9295,25 +9350,7 @@
                       <a:pPr algn="ctr"/>
                       <a:r>
                         <a:rPr lang="en-US" b="1" dirty="0"/>
-                        <a:t>-$42,335</a:t>
-                      </a:r>
-                    </a:p>
-                    <a:p>
-                      <a:pPr algn="ctr"/>
-                      <a:endParaRPr lang="en-US" b="1" dirty="0"/>
-                    </a:p>
-                    <a:p>
-                      <a:pPr algn="ctr"/>
-                      <a:r>
-                        <a:rPr lang="en-US" b="1" dirty="0"/>
-                        <a:t>Long-only strategy = </a:t>
-                      </a:r>
-                    </a:p>
-                    <a:p>
-                      <a:pPr algn="ctr"/>
-                      <a:r>
-                        <a:rPr lang="en-US" b="1" dirty="0"/>
-                        <a:t>-$404</a:t>
+                        <a:t>$2,223</a:t>
                       </a:r>
                     </a:p>
                   </a:txBody>
@@ -9331,7 +9368,7 @@
                       <a:pPr algn="ctr"/>
                       <a:r>
                         <a:rPr lang="en-US" b="1" dirty="0"/>
-                        <a:t>$2092</a:t>
+                        <a:t>$2,388</a:t>
                       </a:r>
                     </a:p>
                   </a:txBody>
@@ -9349,7 +9386,7 @@
                       <a:pPr algn="ctr"/>
                       <a:r>
                         <a:rPr lang="en-US" b="1" dirty="0"/>
-                        <a:t>$6244</a:t>
+                        <a:t>$4,049</a:t>
                       </a:r>
                     </a:p>
                   </a:txBody>
@@ -9365,7 +9402,10 @@
                     <a:lstStyle/>
                     <a:p>
                       <a:pPr algn="ctr"/>
-                      <a:endParaRPr lang="en-US" b="1" dirty="0"/>
+                      <a:r>
+                        <a:rPr lang="en-US" b="1" dirty="0"/>
+                        <a:t>$4,260</a:t>
+                      </a:r>
                     </a:p>
                   </a:txBody>
                   <a:tcPr anchor="ctr">
@@ -9377,6 +9417,282 @@
                 <a:extLst>
                   <a:ext uri="{0D108BD9-81ED-4DB2-BD59-A6C34878D82A}">
                     <a16:rowId xmlns:a16="http://schemas.microsoft.com/office/drawing/2014/main" val="2563252910"/>
+                  </a:ext>
+                </a:extLst>
+              </a:tr>
+              <a:tr h="370840">
+                <a:tc>
+                  <a:txBody>
+                    <a:bodyPr/>
+                    <a:lstStyle/>
+                    <a:p>
+                      <a:r>
+                        <a:rPr lang="en-US" dirty="0"/>
+                        <a:t>Return</a:t>
+                      </a:r>
+                    </a:p>
+                  </a:txBody>
+                  <a:tcPr/>
+                </a:tc>
+                <a:tc>
+                  <a:txBody>
+                    <a:bodyPr/>
+                    <a:lstStyle/>
+                    <a:p>
+                      <a:pPr algn="ctr"/>
+                      <a:r>
+                        <a:rPr lang="en-US" b="1" dirty="0"/>
+                        <a:t>2.23%</a:t>
+                      </a:r>
+                    </a:p>
+                  </a:txBody>
+                  <a:tcPr>
+                    <a:solidFill>
+                      <a:srgbClr val="FF0000"/>
+                    </a:solidFill>
+                  </a:tcPr>
+                </a:tc>
+                <a:tc>
+                  <a:txBody>
+                    <a:bodyPr/>
+                    <a:lstStyle/>
+                    <a:p>
+                      <a:pPr algn="ctr"/>
+                      <a:r>
+                        <a:rPr lang="en-US" b="1" dirty="0"/>
+                        <a:t>2.38%</a:t>
+                      </a:r>
+                    </a:p>
+                  </a:txBody>
+                  <a:tcPr anchor="ctr">
+                    <a:solidFill>
+                      <a:srgbClr val="FFFF00"/>
+                    </a:solidFill>
+                  </a:tcPr>
+                </a:tc>
+                <a:tc>
+                  <a:txBody>
+                    <a:bodyPr/>
+                    <a:lstStyle/>
+                    <a:p>
+                      <a:pPr algn="ctr"/>
+                      <a:r>
+                        <a:rPr lang="en-US" b="1" dirty="0"/>
+                        <a:t>4.05%</a:t>
+                      </a:r>
+                    </a:p>
+                  </a:txBody>
+                  <a:tcPr anchor="ctr">
+                    <a:solidFill>
+                      <a:srgbClr val="00B050"/>
+                    </a:solidFill>
+                  </a:tcPr>
+                </a:tc>
+                <a:tc>
+                  <a:txBody>
+                    <a:bodyPr/>
+                    <a:lstStyle/>
+                    <a:p>
+                      <a:pPr algn="ctr"/>
+                      <a:r>
+                        <a:rPr lang="en-US" b="1" dirty="0"/>
+                        <a:t>4.28%</a:t>
+                      </a:r>
+                    </a:p>
+                  </a:txBody>
+                  <a:tcPr anchor="ctr">
+                    <a:solidFill>
+                      <a:srgbClr val="00B050"/>
+                    </a:solidFill>
+                  </a:tcPr>
+                </a:tc>
+                <a:extLst>
+                  <a:ext uri="{0D108BD9-81ED-4DB2-BD59-A6C34878D82A}">
+                    <a16:rowId xmlns:a16="http://schemas.microsoft.com/office/drawing/2014/main" val="473448512"/>
+                  </a:ext>
+                </a:extLst>
+              </a:tr>
+              <a:tr h="370840">
+                <a:tc>
+                  <a:txBody>
+                    <a:bodyPr/>
+                    <a:lstStyle/>
+                    <a:p>
+                      <a:r>
+                        <a:rPr lang="en-US" dirty="0"/>
+                        <a:t>Volatility</a:t>
+                      </a:r>
+                    </a:p>
+                  </a:txBody>
+                  <a:tcPr/>
+                </a:tc>
+                <a:tc>
+                  <a:txBody>
+                    <a:bodyPr/>
+                    <a:lstStyle/>
+                    <a:p>
+                      <a:pPr algn="ctr"/>
+                      <a:r>
+                        <a:rPr lang="en-US" b="1" dirty="0"/>
+                        <a:t>4.33%</a:t>
+                      </a:r>
+                    </a:p>
+                  </a:txBody>
+                  <a:tcPr>
+                    <a:solidFill>
+                      <a:srgbClr val="FF0000"/>
+                    </a:solidFill>
+                  </a:tcPr>
+                </a:tc>
+                <a:tc>
+                  <a:txBody>
+                    <a:bodyPr/>
+                    <a:lstStyle/>
+                    <a:p>
+                      <a:pPr algn="ctr"/>
+                      <a:r>
+                        <a:rPr lang="en-US" b="1" dirty="0"/>
+                        <a:t>5.86%</a:t>
+                      </a:r>
+                    </a:p>
+                  </a:txBody>
+                  <a:tcPr anchor="ctr">
+                    <a:solidFill>
+                      <a:srgbClr val="FFFF00"/>
+                    </a:solidFill>
+                  </a:tcPr>
+                </a:tc>
+                <a:tc>
+                  <a:txBody>
+                    <a:bodyPr/>
+                    <a:lstStyle/>
+                    <a:p>
+                      <a:pPr algn="ctr"/>
+                      <a:r>
+                        <a:rPr lang="en-US" b="1" dirty="0"/>
+                        <a:t>3.26%</a:t>
+                      </a:r>
+                    </a:p>
+                  </a:txBody>
+                  <a:tcPr anchor="ctr">
+                    <a:solidFill>
+                      <a:srgbClr val="00B050"/>
+                    </a:solidFill>
+                  </a:tcPr>
+                </a:tc>
+                <a:tc>
+                  <a:txBody>
+                    <a:bodyPr/>
+                    <a:lstStyle/>
+                    <a:p>
+                      <a:pPr algn="ctr"/>
+                      <a:r>
+                        <a:rPr lang="en-US" b="1" dirty="0"/>
+                        <a:t>3.28%</a:t>
+                      </a:r>
+                    </a:p>
+                  </a:txBody>
+                  <a:tcPr anchor="ctr">
+                    <a:solidFill>
+                      <a:srgbClr val="00B050"/>
+                    </a:solidFill>
+                  </a:tcPr>
+                </a:tc>
+                <a:extLst>
+                  <a:ext uri="{0D108BD9-81ED-4DB2-BD59-A6C34878D82A}">
+                    <a16:rowId xmlns:a16="http://schemas.microsoft.com/office/drawing/2014/main" val="2404196657"/>
+                  </a:ext>
+                </a:extLst>
+              </a:tr>
+              <a:tr h="370840">
+                <a:tc>
+                  <a:txBody>
+                    <a:bodyPr/>
+                    <a:lstStyle/>
+                    <a:p>
+                      <a:r>
+                        <a:rPr lang="en-US" dirty="0"/>
+                        <a:t>Sharpe Ratio</a:t>
+                      </a:r>
+                    </a:p>
+                  </a:txBody>
+                  <a:tcPr/>
+                </a:tc>
+                <a:tc>
+                  <a:txBody>
+                    <a:bodyPr/>
+                    <a:lstStyle/>
+                    <a:p>
+                      <a:pPr algn="ctr"/>
+                      <a:r>
+                        <a:rPr lang="en-US" b="1" dirty="0"/>
+                        <a:t>.5357</a:t>
+                      </a:r>
+                    </a:p>
+                  </a:txBody>
+                  <a:tcPr>
+                    <a:solidFill>
+                      <a:srgbClr val="FF0000"/>
+                    </a:solidFill>
+                  </a:tcPr>
+                </a:tc>
+                <a:tc>
+                  <a:txBody>
+                    <a:bodyPr/>
+                    <a:lstStyle/>
+                    <a:p>
+                      <a:pPr algn="ctr"/>
+                      <a:r>
+                        <a:rPr lang="en-US" b="1" dirty="0"/>
+                        <a:t>.4327</a:t>
+                      </a:r>
+                    </a:p>
+                  </a:txBody>
+                  <a:tcPr anchor="ctr">
+                    <a:solidFill>
+                      <a:srgbClr val="FFFF00"/>
+                    </a:solidFill>
+                  </a:tcPr>
+                </a:tc>
+                <a:tc>
+                  <a:txBody>
+                    <a:bodyPr/>
+                    <a:lstStyle/>
+                    <a:p>
+                      <a:pPr algn="ctr"/>
+                      <a:r>
+                        <a:rPr lang="en-US" b="1" dirty="0"/>
+                        <a:t>.5138</a:t>
+                      </a:r>
+                    </a:p>
+                  </a:txBody>
+                  <a:tcPr anchor="ctr">
+                    <a:solidFill>
+                      <a:srgbClr val="00B050"/>
+                    </a:solidFill>
+                  </a:tcPr>
+                </a:tc>
+                <a:tc>
+                  <a:txBody>
+                    <a:bodyPr/>
+                    <a:lstStyle/>
+                    <a:p>
+                      <a:pPr algn="ctr"/>
+                      <a:r>
+                        <a:rPr lang="en-US" b="1" dirty="0"/>
+                        <a:t>.4924</a:t>
+                      </a:r>
+                    </a:p>
+                  </a:txBody>
+                  <a:tcPr anchor="ctr">
+                    <a:solidFill>
+                      <a:srgbClr val="00B050"/>
+                    </a:solidFill>
+                  </a:tcPr>
+                </a:tc>
+                <a:extLst>
+                  <a:ext uri="{0D108BD9-81ED-4DB2-BD59-A6C34878D82A}">
+                    <a16:rowId xmlns:a16="http://schemas.microsoft.com/office/drawing/2014/main" val="686809780"/>
                   </a:ext>
                 </a:extLst>
               </a:tr>
@@ -10018,15 +10334,6 @@
 </file>
 
 <file path=customXml/item1.xml><?xml version="1.0" encoding="utf-8"?>
-<p:properties xmlns:p="http://schemas.microsoft.com/office/2006/metadata/properties" xmlns:xsi="http://www.w3.org/2001/XMLSchema-instance" xmlns:pc="http://schemas.microsoft.com/office/infopath/2007/PartnerControls">
-  <documentManagement>
-    <Status xmlns="71af3243-3dd4-4a8d-8c0d-dd76da1f02a5">Not started</Status>
-    <MediaServiceKeyPoints xmlns="71af3243-3dd4-4a8d-8c0d-dd76da1f02a5" xsi:nil="true"/>
-  </documentManagement>
-</p:properties>
-</file>
-
-<file path=customXml/item2.xml><?xml version="1.0" encoding="utf-8"?>
 <ct:contentTypeSchema xmlns:ct="http://schemas.microsoft.com/office/2006/metadata/contentType" xmlns:ma="http://schemas.microsoft.com/office/2006/metadata/properties/metaAttributes" ct:_="" ma:_="" ma:contentTypeName="Document" ma:contentTypeID="0x01010079F111ED35F8CC479449609E8A0923A6" ma:contentTypeVersion="12" ma:contentTypeDescription="Create a new document." ma:contentTypeScope="" ma:versionID="a410dd7f93c95333ffa1b60ed6adedd1">
   <xsd:schema xmlns:xsd="http://www.w3.org/2001/XMLSchema" xmlns:xs="http://www.w3.org/2001/XMLSchema" xmlns:p="http://schemas.microsoft.com/office/2006/metadata/properties" xmlns:ns2="71af3243-3dd4-4a8d-8c0d-dd76da1f02a5" xmlns:ns3="16c05727-aa75-4e4a-9b5f-8a80a1165891" targetNamespace="http://schemas.microsoft.com/office/2006/metadata/properties" ma:root="true" ma:fieldsID="a936d9baba76aa3866493feff160faab" ns2:_="" ns3:_="">
     <xsd:import namespace="71af3243-3dd4-4a8d-8c0d-dd76da1f02a5"/>
@@ -10247,6 +10554,15 @@
 </ct:contentTypeSchema>
 </file>
 
+<file path=customXml/item2.xml><?xml version="1.0" encoding="utf-8"?>
+<p:properties xmlns:p="http://schemas.microsoft.com/office/2006/metadata/properties" xmlns:xsi="http://www.w3.org/2001/XMLSchema-instance" xmlns:pc="http://schemas.microsoft.com/office/infopath/2007/PartnerControls">
+  <documentManagement>
+    <Status xmlns="71af3243-3dd4-4a8d-8c0d-dd76da1f02a5">Not started</Status>
+    <MediaServiceKeyPoints xmlns="71af3243-3dd4-4a8d-8c0d-dd76da1f02a5" xsi:nil="true"/>
+  </documentManagement>
+</p:properties>
+</file>
+
 <file path=customXml/item3.xml><?xml version="1.0" encoding="utf-8"?>
 <?mso-contentType ?>
 <FormTemplates xmlns="http://schemas.microsoft.com/sharepoint/v3/contenttype/forms">
@@ -10257,16 +10573,6 @@
 </file>
 
 <file path=customXml/itemProps1.xml><?xml version="1.0" encoding="utf-8"?>
-<ds:datastoreItem xmlns:ds="http://schemas.openxmlformats.org/officeDocument/2006/customXml" ds:itemID="{52F3B215-496E-4790-A364-7C1C46DEC771}">
-  <ds:schemaRefs>
-    <ds:schemaRef ds:uri="http://schemas.microsoft.com/office/2006/metadata/properties"/>
-    <ds:schemaRef ds:uri="http://schemas.microsoft.com/office/infopath/2007/PartnerControls"/>
-    <ds:schemaRef ds:uri="71af3243-3dd4-4a8d-8c0d-dd76da1f02a5"/>
-  </ds:schemaRefs>
-</ds:datastoreItem>
-</file>
-
-<file path=customXml/itemProps2.xml><?xml version="1.0" encoding="utf-8"?>
 <ds:datastoreItem xmlns:ds="http://schemas.openxmlformats.org/officeDocument/2006/customXml" ds:itemID="{50DB95DD-0319-4EE5-8C5C-9CEDF75E024B}">
   <ds:schemaRefs>
     <ds:schemaRef ds:uri="http://schemas.microsoft.com/office/2006/metadata/contentType"/>
@@ -10285,6 +10591,16 @@
 </ds:datastoreItem>
 </file>
 
+<file path=customXml/itemProps2.xml><?xml version="1.0" encoding="utf-8"?>
+<ds:datastoreItem xmlns:ds="http://schemas.openxmlformats.org/officeDocument/2006/customXml" ds:itemID="{52F3B215-496E-4790-A364-7C1C46DEC771}">
+  <ds:schemaRefs>
+    <ds:schemaRef ds:uri="http://schemas.microsoft.com/office/2006/metadata/properties"/>
+    <ds:schemaRef ds:uri="http://schemas.microsoft.com/office/infopath/2007/PartnerControls"/>
+    <ds:schemaRef ds:uri="71af3243-3dd4-4a8d-8c0d-dd76da1f02a5"/>
+  </ds:schemaRefs>
+</ds:datastoreItem>
+</file>
+
 <file path=customXml/itemProps3.xml><?xml version="1.0" encoding="utf-8"?>
 <ds:datastoreItem xmlns:ds="http://schemas.openxmlformats.org/officeDocument/2006/customXml" ds:itemID="{AE2713E1-6312-427E-BFCB-C5A5DA301373}">
   <ds:schemaRefs>

</xml_diff>